<commit_message>
Changes to existing Tutorial files
</commit_message>
<xml_diff>
--- a/docs/sasview/Tutorial.pptx
+++ b/docs/sasview/Tutorial.pptx
@@ -232,7 +232,7 @@
             <a:fld id="{ADF864E8-D8BA-455C-BC0C-1F3741EC3C1C}" type="datetimeFigureOut">
               <a:rPr lang="en-US" smtClean="0"/>
               <a:pPr/>
-              <a:t>6/15/2015</a:t>
+              <a:t>4/11/2017</a:t>
             </a:fld>
             <a:endParaRPr lang="en-US"/>
           </a:p>
@@ -767,7 +767,7 @@
             <a:fld id="{0C0FAC7B-070D-4BC5-975E-2226A222BC04}" type="datetimeFigureOut">
               <a:rPr lang="en-US" smtClean="0"/>
               <a:pPr/>
-              <a:t>6/15/2015</a:t>
+              <a:t>4/11/2017</a:t>
             </a:fld>
             <a:endParaRPr lang="en-US"/>
           </a:p>
@@ -934,7 +934,7 @@
             <a:fld id="{0C0FAC7B-070D-4BC5-975E-2226A222BC04}" type="datetimeFigureOut">
               <a:rPr lang="en-US" smtClean="0"/>
               <a:pPr/>
-              <a:t>6/15/2015</a:t>
+              <a:t>4/11/2017</a:t>
             </a:fld>
             <a:endParaRPr lang="en-US"/>
           </a:p>
@@ -1111,7 +1111,7 @@
             <a:fld id="{0C0FAC7B-070D-4BC5-975E-2226A222BC04}" type="datetimeFigureOut">
               <a:rPr lang="en-US" smtClean="0"/>
               <a:pPr/>
-              <a:t>6/15/2015</a:t>
+              <a:t>4/11/2017</a:t>
             </a:fld>
             <a:endParaRPr lang="en-US"/>
           </a:p>
@@ -1278,7 +1278,7 @@
             <a:fld id="{0C0FAC7B-070D-4BC5-975E-2226A222BC04}" type="datetimeFigureOut">
               <a:rPr lang="en-US" smtClean="0"/>
               <a:pPr/>
-              <a:t>6/15/2015</a:t>
+              <a:t>4/11/2017</a:t>
             </a:fld>
             <a:endParaRPr lang="en-US"/>
           </a:p>
@@ -1521,7 +1521,7 @@
             <a:fld id="{0C0FAC7B-070D-4BC5-975E-2226A222BC04}" type="datetimeFigureOut">
               <a:rPr lang="en-US" smtClean="0"/>
               <a:pPr/>
-              <a:t>6/15/2015</a:t>
+              <a:t>4/11/2017</a:t>
             </a:fld>
             <a:endParaRPr lang="en-US"/>
           </a:p>
@@ -1806,7 +1806,7 @@
             <a:fld id="{0C0FAC7B-070D-4BC5-975E-2226A222BC04}" type="datetimeFigureOut">
               <a:rPr lang="en-US" smtClean="0"/>
               <a:pPr/>
-              <a:t>6/15/2015</a:t>
+              <a:t>4/11/2017</a:t>
             </a:fld>
             <a:endParaRPr lang="en-US"/>
           </a:p>
@@ -2225,7 +2225,7 @@
             <a:fld id="{0C0FAC7B-070D-4BC5-975E-2226A222BC04}" type="datetimeFigureOut">
               <a:rPr lang="en-US" smtClean="0"/>
               <a:pPr/>
-              <a:t>6/15/2015</a:t>
+              <a:t>4/11/2017</a:t>
             </a:fld>
             <a:endParaRPr lang="en-US"/>
           </a:p>
@@ -2340,7 +2340,7 @@
             <a:fld id="{0C0FAC7B-070D-4BC5-975E-2226A222BC04}" type="datetimeFigureOut">
               <a:rPr lang="en-US" smtClean="0"/>
               <a:pPr/>
-              <a:t>6/15/2015</a:t>
+              <a:t>4/11/2017</a:t>
             </a:fld>
             <a:endParaRPr lang="en-US"/>
           </a:p>
@@ -2432,7 +2432,7 @@
             <a:fld id="{0C0FAC7B-070D-4BC5-975E-2226A222BC04}" type="datetimeFigureOut">
               <a:rPr lang="en-US" smtClean="0"/>
               <a:pPr/>
-              <a:t>6/15/2015</a:t>
+              <a:t>4/11/2017</a:t>
             </a:fld>
             <a:endParaRPr lang="en-US"/>
           </a:p>
@@ -2706,7 +2706,7 @@
             <a:fld id="{0C0FAC7B-070D-4BC5-975E-2226A222BC04}" type="datetimeFigureOut">
               <a:rPr lang="en-US" smtClean="0"/>
               <a:pPr/>
-              <a:t>6/15/2015</a:t>
+              <a:t>4/11/2017</a:t>
             </a:fld>
             <a:endParaRPr lang="en-US"/>
           </a:p>
@@ -2956,7 +2956,7 @@
             <a:fld id="{0C0FAC7B-070D-4BC5-975E-2226A222BC04}" type="datetimeFigureOut">
               <a:rPr lang="en-US" smtClean="0"/>
               <a:pPr/>
-              <a:t>6/15/2015</a:t>
+              <a:t>4/11/2017</a:t>
             </a:fld>
             <a:endParaRPr lang="en-US"/>
           </a:p>
@@ -3166,7 +3166,7 @@
             <a:fld id="{0C0FAC7B-070D-4BC5-975E-2226A222BC04}" type="datetimeFigureOut">
               <a:rPr lang="en-US" smtClean="0"/>
               <a:pPr/>
-              <a:t>6/15/2015</a:t>
+              <a:t>4/11/2017</a:t>
             </a:fld>
             <a:endParaRPr lang="en-US"/>
           </a:p>
@@ -3598,7 +3598,11 @@
             </a:r>
             <a:r>
               <a:rPr lang="en-US" b="1" dirty="0" smtClean="0"/>
-              <a:t> 3.n.x</a:t>
+              <a:t> </a:t>
+            </a:r>
+            <a:r>
+              <a:rPr lang="en-US" b="1" dirty="0" smtClean="0"/>
+              <a:t>4.n.x</a:t>
             </a:r>
             <a:endParaRPr lang="en-US" dirty="0" smtClean="0"/>
           </a:p>
@@ -3613,7 +3617,7 @@
         <p:spPr>
           <a:xfrm>
             <a:off x="533400" y="1383029"/>
-            <a:ext cx="5791200" cy="5693866"/>
+            <a:ext cx="5791200" cy="5909310"/>
           </a:xfrm>
           <a:prstGeom prst="rect">
             <a:avLst/>
@@ -3670,7 +3674,39 @@
             </a:r>
             <a:r>
               <a:rPr lang="en-US" sz="1400" b="1" dirty="0" smtClean="0"/>
-              <a:t> 3.n.x. We have not, however, had the time to update this tutorial. Instead we have chosen to focus our documentation resources on a complete overhaul of the </a:t>
+              <a:t> </a:t>
+            </a:r>
+            <a:r>
+              <a:rPr lang="en-US" sz="1400" b="1" dirty="0" smtClean="0"/>
+              <a:t>4.n.x</a:t>
+            </a:r>
+            <a:r>
+              <a:rPr lang="en-US" sz="1400" b="1" dirty="0" smtClean="0"/>
+              <a:t>. </a:t>
+            </a:r>
+            <a:r>
+              <a:rPr lang="en-US" sz="1400" b="1" dirty="0" smtClean="0"/>
+              <a:t>Rathe</a:t>
+            </a:r>
+            <a:r>
+              <a:rPr lang="en-US" sz="1400" b="1" dirty="0" smtClean="0"/>
+              <a:t>r than spending time </a:t>
+            </a:r>
+            <a:r>
+              <a:rPr lang="en-US" sz="1400" b="1" dirty="0" smtClean="0"/>
+              <a:t>updating </a:t>
+            </a:r>
+            <a:r>
+              <a:rPr lang="en-US" sz="1400" b="1" dirty="0" smtClean="0"/>
+              <a:t>this </a:t>
+            </a:r>
+            <a:r>
+              <a:rPr lang="en-US" sz="1400" b="1" dirty="0" smtClean="0"/>
+              <a:t>tutorial, we have instead been overhauling </a:t>
+            </a:r>
+            <a:r>
+              <a:rPr lang="en-US" sz="1400" b="1" dirty="0" smtClean="0"/>
+              <a:t>the </a:t>
             </a:r>
             <a:r>
               <a:rPr lang="en-US" sz="1400" b="1" dirty="0" err="1" smtClean="0"/>
@@ -3678,8 +3714,37 @@
             </a:r>
             <a:r>
               <a:rPr lang="en-US" sz="1400" b="1" dirty="0" smtClean="0"/>
-              <a:t> help guide (select ‘Help’ in the program menu bar).</a:t>
-            </a:r>
+              <a:t> help guide (select ‘Help’ in the program menu bar</a:t>
+            </a:r>
+            <a:r>
+              <a:rPr lang="en-US" sz="1400" b="1" dirty="0" smtClean="0"/>
+              <a:t>) and initiating a new suite of tutorials. </a:t>
+            </a:r>
+            <a:r>
+              <a:rPr lang="en-US" sz="1400" b="1" dirty="0" smtClean="0"/>
+              <a:t>Indeed, we hope that members of the SAS Community, like yourself, will contribute some of these tutorials! If you want to know more, then please </a:t>
+            </a:r>
+            <a:r>
+              <a:rPr lang="en-US" sz="1400" b="1" dirty="0"/>
+              <a:t>visit: </a:t>
+            </a:r>
+            <a:r>
+              <a:rPr lang="en-US" sz="1400" b="1" dirty="0">
+                <a:hlinkClick r:id="rId2"/>
+              </a:rPr>
+              <a:t>http://</a:t>
+            </a:r>
+            <a:r>
+              <a:rPr lang="en-US" sz="1400" b="1" dirty="0" smtClean="0">
+                <a:hlinkClick r:id="rId2"/>
+              </a:rPr>
+              <a:t>trac.sasview.org/wiki/TutorialsTNGForAuthors</a:t>
+            </a:r>
+            <a:r>
+              <a:rPr lang="en-US" sz="1400" b="1" dirty="0" smtClean="0"/>
+              <a:t> .</a:t>
+            </a:r>
+            <a:endParaRPr lang="en-US" sz="1400" b="1" dirty="0" smtClean="0"/>
           </a:p>
           <a:p>
             <a:pPr algn="just"/>
@@ -3697,11 +3762,7 @@
             </a:r>
             <a:r>
               <a:rPr lang="en-US" sz="1400" b="1" dirty="0" smtClean="0"/>
-              <a:t>, be aware that some functionality may have been added, changed, or even removed. </a:t>
-            </a:r>
-            <a:r>
-              <a:rPr lang="en-US" sz="1400" b="1" dirty="0" smtClean="0"/>
-              <a:t>So use this tutorial in concert with the help guide.</a:t>
+              <a:t>, be aware that some functionality may have been added, changed, or even removed. So use this tutorial in concert with the help guide.</a:t>
             </a:r>
           </a:p>
           <a:p>
@@ -3712,7 +3773,15 @@
             <a:pPr algn="just"/>
             <a:r>
               <a:rPr lang="en-US" sz="1400" b="1" dirty="0" smtClean="0"/>
-              <a:t>A revised tutorial will appear in the fullness of time.</a:t>
+              <a:t>Thank you for your patience, and we hope you enjoy using </a:t>
+            </a:r>
+            <a:r>
+              <a:rPr lang="en-US" sz="1400" b="1" dirty="0" err="1" smtClean="0"/>
+              <a:t>SasView</a:t>
+            </a:r>
+            <a:r>
+              <a:rPr lang="en-US" sz="1400" b="1" dirty="0" smtClean="0"/>
+              <a:t>!</a:t>
             </a:r>
           </a:p>
           <a:p>
@@ -3721,9 +3790,17 @@
           </a:p>
           <a:p>
             <a:pPr algn="just"/>
+            <a:endParaRPr lang="en-US" sz="1400" b="1" dirty="0" smtClean="0"/>
+          </a:p>
+          <a:p>
+            <a:pPr algn="just"/>
+            <a:endParaRPr lang="en-US" sz="1400" b="1" dirty="0" smtClean="0"/>
+          </a:p>
+          <a:p>
+            <a:pPr algn="r"/>
             <a:r>
               <a:rPr lang="en-US" sz="1400" b="1" dirty="0" smtClean="0"/>
-              <a:t>Thank you for your patience, and we hope you enjoy using </a:t>
+              <a:t>The </a:t>
             </a:r>
             <a:r>
               <a:rPr lang="en-US" sz="1400" b="1" dirty="0" err="1" smtClean="0"/>
@@ -3731,36 +3808,8 @@
             </a:r>
             <a:r>
               <a:rPr lang="en-US" sz="1400" b="1" dirty="0" smtClean="0"/>
-              <a:t>!</a:t>
-            </a:r>
-          </a:p>
-          <a:p>
-            <a:pPr algn="just"/>
-            <a:endParaRPr lang="en-US" sz="1400" b="1" dirty="0"/>
-          </a:p>
-          <a:p>
-            <a:pPr algn="just"/>
-            <a:endParaRPr lang="en-US" sz="1400" b="1" dirty="0" smtClean="0"/>
-          </a:p>
-          <a:p>
-            <a:pPr algn="just"/>
-            <a:endParaRPr lang="en-US" sz="1400" b="1" dirty="0" smtClean="0"/>
-          </a:p>
-          <a:p>
-            <a:pPr algn="r"/>
-            <a:r>
-              <a:rPr lang="en-US" sz="1400" b="1" dirty="0" smtClean="0"/>
-              <a:t>The </a:t>
-            </a:r>
-            <a:r>
-              <a:rPr lang="en-US" sz="1400" b="1" dirty="0" err="1" smtClean="0"/>
-              <a:t>SasView</a:t>
-            </a:r>
-            <a:r>
-              <a:rPr lang="en-US" sz="1400" b="1" dirty="0" smtClean="0"/>
               <a:t> Developers</a:t>
             </a:r>
-            <a:endParaRPr lang="en-US" sz="1400" b="1" dirty="0" smtClean="0"/>
           </a:p>
         </p:txBody>
       </p:sp>
@@ -17597,7 +17646,7 @@
           <a:graphicData uri="http://schemas.openxmlformats.org/presentationml/2006/ole">
             <mc:AlternateContent xmlns:mc="http://schemas.openxmlformats.org/markup-compatibility/2006">
               <mc:Choice xmlns:v="urn:schemas-microsoft-com:vml" Requires="v">
-                <p:oleObj spid="_x0000_s4137" name="Equation" r:id="rId3" imgW="1206360" imgH="330120" progId="Equation.3">
+                <p:oleObj spid="_x0000_s4141" name="Equation" r:id="rId3" imgW="1206360" imgH="330120" progId="Equation.3">
                   <p:embed/>
                 </p:oleObj>
               </mc:Choice>
@@ -17667,7 +17716,7 @@
           <a:graphicData uri="http://schemas.openxmlformats.org/presentationml/2006/ole">
             <mc:AlternateContent xmlns:mc="http://schemas.openxmlformats.org/markup-compatibility/2006">
               <mc:Choice xmlns:v="urn:schemas-microsoft-com:vml" Requires="v">
-                <p:oleObj spid="_x0000_s4138" name="Equation" r:id="rId5" imgW="1206360" imgH="330120" progId="Equation.3">
+                <p:oleObj spid="_x0000_s4142" name="Equation" r:id="rId5" imgW="1206360" imgH="330120" progId="Equation.3">
                   <p:embed/>
                 </p:oleObj>
               </mc:Choice>
@@ -18082,7 +18131,7 @@
           <a:graphicData uri="http://schemas.openxmlformats.org/presentationml/2006/ole">
             <mc:AlternateContent xmlns:mc="http://schemas.openxmlformats.org/markup-compatibility/2006">
               <mc:Choice xmlns:v="urn:schemas-microsoft-com:vml" Requires="v">
-                <p:oleObj spid="_x0000_s51210" name="Equation" r:id="rId4" imgW="1536480" imgH="444240" progId="Equation.3">
+                <p:oleObj spid="_x0000_s51216" name="Equation" r:id="rId4" imgW="1536480" imgH="444240" progId="Equation.3">
                   <p:embed/>
                 </p:oleObj>
               </mc:Choice>
@@ -18152,7 +18201,7 @@
           <a:graphicData uri="http://schemas.openxmlformats.org/presentationml/2006/ole">
             <mc:AlternateContent xmlns:mc="http://schemas.openxmlformats.org/markup-compatibility/2006">
               <mc:Choice xmlns:v="urn:schemas-microsoft-com:vml" Requires="v">
-                <p:oleObj spid="_x0000_s51211" name="Equation" r:id="rId6" imgW="965160" imgH="431640" progId="Equation.3">
+                <p:oleObj spid="_x0000_s51217" name="Equation" r:id="rId6" imgW="965160" imgH="431640" progId="Equation.3">
                   <p:embed/>
                 </p:oleObj>
               </mc:Choice>
@@ -18222,7 +18271,7 @@
           <a:graphicData uri="http://schemas.openxmlformats.org/presentationml/2006/ole">
             <mc:AlternateContent xmlns:mc="http://schemas.openxmlformats.org/markup-compatibility/2006">
               <mc:Choice xmlns:v="urn:schemas-microsoft-com:vml" Requires="v">
-                <p:oleObj spid="_x0000_s51212" name="Equation" r:id="rId8" imgW="1752480" imgH="444240" progId="Equation.3">
+                <p:oleObj spid="_x0000_s51218" name="Equation" r:id="rId8" imgW="1752480" imgH="444240" progId="Equation.3">
                   <p:embed/>
                 </p:oleObj>
               </mc:Choice>

</xml_diff>

<commit_message>
Updated tutorial cover page and acknowledgement text
</commit_message>
<xml_diff>
--- a/docs/sasview/Tutorial.pptx
+++ b/docs/sasview/Tutorial.pptx
@@ -146,6 +146,22 @@
       </a:defRPr>
     </a:lvl9pPr>
   </p:defaultTextStyle>
+  <p:extLst>
+    <p:ext uri="{EFAFB233-063F-42B5-8137-9DF3F51BA10A}">
+      <p15:sldGuideLst xmlns:p15="http://schemas.microsoft.com/office/powerpoint/2012/main">
+        <p15:guide id="1" orient="horz" pos="2880">
+          <p15:clr>
+            <a:srgbClr val="A4A3A4"/>
+          </p15:clr>
+        </p15:guide>
+        <p15:guide id="2" pos="2160">
+          <p15:clr>
+            <a:srgbClr val="A4A3A4"/>
+          </p15:clr>
+        </p15:guide>
+      </p15:sldGuideLst>
+    </p:ext>
+  </p:extLst>
 </p:presentation>
 </file>
 
@@ -232,7 +248,7 @@
             <a:fld id="{ADF864E8-D8BA-455C-BC0C-1F3741EC3C1C}" type="datetimeFigureOut">
               <a:rPr lang="en-US" smtClean="0"/>
               <a:pPr/>
-              <a:t>4/11/2017</a:t>
+              <a:t>9/11/2018</a:t>
             </a:fld>
             <a:endParaRPr lang="en-US"/>
           </a:p>
@@ -767,7 +783,7 @@
             <a:fld id="{0C0FAC7B-070D-4BC5-975E-2226A222BC04}" type="datetimeFigureOut">
               <a:rPr lang="en-US" smtClean="0"/>
               <a:pPr/>
-              <a:t>4/11/2017</a:t>
+              <a:t>9/11/2018</a:t>
             </a:fld>
             <a:endParaRPr lang="en-US"/>
           </a:p>
@@ -934,7 +950,7 @@
             <a:fld id="{0C0FAC7B-070D-4BC5-975E-2226A222BC04}" type="datetimeFigureOut">
               <a:rPr lang="en-US" smtClean="0"/>
               <a:pPr/>
-              <a:t>4/11/2017</a:t>
+              <a:t>9/11/2018</a:t>
             </a:fld>
             <a:endParaRPr lang="en-US"/>
           </a:p>
@@ -1111,7 +1127,7 @@
             <a:fld id="{0C0FAC7B-070D-4BC5-975E-2226A222BC04}" type="datetimeFigureOut">
               <a:rPr lang="en-US" smtClean="0"/>
               <a:pPr/>
-              <a:t>4/11/2017</a:t>
+              <a:t>9/11/2018</a:t>
             </a:fld>
             <a:endParaRPr lang="en-US"/>
           </a:p>
@@ -1278,7 +1294,7 @@
             <a:fld id="{0C0FAC7B-070D-4BC5-975E-2226A222BC04}" type="datetimeFigureOut">
               <a:rPr lang="en-US" smtClean="0"/>
               <a:pPr/>
-              <a:t>4/11/2017</a:t>
+              <a:t>9/11/2018</a:t>
             </a:fld>
             <a:endParaRPr lang="en-US"/>
           </a:p>
@@ -1521,7 +1537,7 @@
             <a:fld id="{0C0FAC7B-070D-4BC5-975E-2226A222BC04}" type="datetimeFigureOut">
               <a:rPr lang="en-US" smtClean="0"/>
               <a:pPr/>
-              <a:t>4/11/2017</a:t>
+              <a:t>9/11/2018</a:t>
             </a:fld>
             <a:endParaRPr lang="en-US"/>
           </a:p>
@@ -1806,7 +1822,7 @@
             <a:fld id="{0C0FAC7B-070D-4BC5-975E-2226A222BC04}" type="datetimeFigureOut">
               <a:rPr lang="en-US" smtClean="0"/>
               <a:pPr/>
-              <a:t>4/11/2017</a:t>
+              <a:t>9/11/2018</a:t>
             </a:fld>
             <a:endParaRPr lang="en-US"/>
           </a:p>
@@ -2225,7 +2241,7 @@
             <a:fld id="{0C0FAC7B-070D-4BC5-975E-2226A222BC04}" type="datetimeFigureOut">
               <a:rPr lang="en-US" smtClean="0"/>
               <a:pPr/>
-              <a:t>4/11/2017</a:t>
+              <a:t>9/11/2018</a:t>
             </a:fld>
             <a:endParaRPr lang="en-US"/>
           </a:p>
@@ -2340,7 +2356,7 @@
             <a:fld id="{0C0FAC7B-070D-4BC5-975E-2226A222BC04}" type="datetimeFigureOut">
               <a:rPr lang="en-US" smtClean="0"/>
               <a:pPr/>
-              <a:t>4/11/2017</a:t>
+              <a:t>9/11/2018</a:t>
             </a:fld>
             <a:endParaRPr lang="en-US"/>
           </a:p>
@@ -2432,7 +2448,7 @@
             <a:fld id="{0C0FAC7B-070D-4BC5-975E-2226A222BC04}" type="datetimeFigureOut">
               <a:rPr lang="en-US" smtClean="0"/>
               <a:pPr/>
-              <a:t>4/11/2017</a:t>
+              <a:t>9/11/2018</a:t>
             </a:fld>
             <a:endParaRPr lang="en-US"/>
           </a:p>
@@ -2706,7 +2722,7 @@
             <a:fld id="{0C0FAC7B-070D-4BC5-975E-2226A222BC04}" type="datetimeFigureOut">
               <a:rPr lang="en-US" smtClean="0"/>
               <a:pPr/>
-              <a:t>4/11/2017</a:t>
+              <a:t>9/11/2018</a:t>
             </a:fld>
             <a:endParaRPr lang="en-US"/>
           </a:p>
@@ -2956,7 +2972,7 @@
             <a:fld id="{0C0FAC7B-070D-4BC5-975E-2226A222BC04}" type="datetimeFigureOut">
               <a:rPr lang="en-US" smtClean="0"/>
               <a:pPr/>
-              <a:t>4/11/2017</a:t>
+              <a:t>9/11/2018</a:t>
             </a:fld>
             <a:endParaRPr lang="en-US"/>
           </a:p>
@@ -3166,7 +3182,7 @@
             <a:fld id="{0C0FAC7B-070D-4BC5-975E-2226A222BC04}" type="datetimeFigureOut">
               <a:rPr lang="en-US" smtClean="0"/>
               <a:pPr/>
-              <a:t>4/11/2017</a:t>
+              <a:t>9/11/2018</a:t>
             </a:fld>
             <a:endParaRPr lang="en-US"/>
           </a:p>
@@ -3576,7 +3592,7 @@
         <p:spPr>
           <a:xfrm>
             <a:off x="1718115" y="251697"/>
-            <a:ext cx="3421771" cy="369332"/>
+            <a:ext cx="3989234" cy="369332"/>
           </a:xfrm>
           <a:prstGeom prst="rect">
             <a:avLst/>
@@ -3590,19 +3606,11 @@
           <a:p>
             <a:r>
               <a:rPr lang="en-US" b="1" dirty="0" smtClean="0"/>
-              <a:t>Preface for Users of </a:t>
-            </a:r>
-            <a:r>
-              <a:rPr lang="en-US" b="1" dirty="0" err="1" smtClean="0"/>
-              <a:t>SasView</a:t>
+              <a:t>Preface for Users of SasView </a:t>
             </a:r>
             <a:r>
               <a:rPr lang="en-US" b="1" dirty="0" smtClean="0"/>
-              <a:t> </a:t>
-            </a:r>
-            <a:r>
-              <a:rPr lang="en-US" b="1" dirty="0" smtClean="0"/>
-              <a:t>4.n.x</a:t>
+              <a:t>3.n.x/4.n.x</a:t>
             </a:r>
             <a:endParaRPr lang="en-US" dirty="0" smtClean="0"/>
           </a:p>
@@ -3617,7 +3625,7 @@
         <p:spPr>
           <a:xfrm>
             <a:off x="533400" y="1383029"/>
-            <a:ext cx="5791200" cy="5909310"/>
+            <a:ext cx="5791200" cy="6555641"/>
           </a:xfrm>
           <a:prstGeom prst="rect">
             <a:avLst/>
@@ -3658,7 +3666,88 @@
             <a:pPr algn="just"/>
             <a:r>
               <a:rPr lang="en-US" sz="1400" b="1" dirty="0" smtClean="0"/>
-              <a:t>This tutorial was written for </a:t>
+              <a:t>This tutorial was written for SasView 2.1.x, and you are now using </a:t>
+            </a:r>
+            <a:r>
+              <a:rPr lang="en-US" sz="1400" b="1" dirty="0" smtClean="0"/>
+              <a:t>SasView 3.n.x/4.n.x</a:t>
+            </a:r>
+            <a:r>
+              <a:rPr lang="en-US" sz="1400" b="1" dirty="0" smtClean="0"/>
+              <a:t>. Rather than spending time updating this tutorial, we have instead been overhauling the SasView </a:t>
+            </a:r>
+            <a:r>
+              <a:rPr lang="en-US" sz="1400" b="1" dirty="0" smtClean="0"/>
+              <a:t>documentation</a:t>
+            </a:r>
+            <a:r>
+              <a:rPr lang="en-US" sz="1400" b="1" dirty="0" smtClean="0"/>
+              <a:t> </a:t>
+            </a:r>
+            <a:r>
+              <a:rPr lang="en-US" sz="1400" b="1" dirty="0" smtClean="0"/>
+              <a:t>(select ‘Help</a:t>
+            </a:r>
+            <a:r>
+              <a:rPr lang="en-US" sz="1400" b="1" dirty="0" smtClean="0"/>
+              <a:t>’ then ‘Documentation’ </a:t>
+            </a:r>
+            <a:r>
+              <a:rPr lang="en-US" sz="1400" b="1" dirty="0" smtClean="0"/>
+              <a:t>in the program menu bar) and initiating a new suite of </a:t>
+            </a:r>
+            <a:r>
+              <a:rPr lang="en-US" sz="1400" b="1" dirty="0"/>
+              <a:t>tutorials (see </a:t>
+            </a:r>
+            <a:r>
+              <a:rPr lang="en-US" sz="1400" b="1" dirty="0">
+                <a:hlinkClick r:id="rId2"/>
+              </a:rPr>
+              <a:t>http://www.sasview.org/links.html</a:t>
+            </a:r>
+            <a:r>
+              <a:rPr lang="en-US" sz="1400" b="1" dirty="0" smtClean="0"/>
+              <a:t>). </a:t>
+            </a:r>
+            <a:r>
+              <a:rPr lang="en-US" sz="1400" b="1" dirty="0" smtClean="0"/>
+              <a:t>Indeed</a:t>
+            </a:r>
+            <a:r>
+              <a:rPr lang="en-US" sz="1400" b="1" dirty="0" smtClean="0"/>
+              <a:t>, we hope that members of the SAS Community, like yourself, will contribute some of these tutorials! If you want to know more, then please </a:t>
+            </a:r>
+            <a:r>
+              <a:rPr lang="en-US" sz="1400" b="1" dirty="0"/>
+              <a:t>visit: </a:t>
+            </a:r>
+            <a:r>
+              <a:rPr lang="en-US" sz="1400" b="1" dirty="0">
+                <a:hlinkClick r:id="rId3"/>
+              </a:rPr>
+              <a:t>http://</a:t>
+            </a:r>
+            <a:r>
+              <a:rPr lang="en-US" sz="1400" b="1" dirty="0" smtClean="0">
+                <a:hlinkClick r:id="rId3"/>
+              </a:rPr>
+              <a:t>trac.sasview.org/wiki/TutorialsTNGForAuthors</a:t>
+            </a:r>
+            <a:r>
+              <a:rPr lang="en-US" sz="1400" b="1" dirty="0" smtClean="0"/>
+              <a:t> .</a:t>
+            </a:r>
+          </a:p>
+          <a:p>
+            <a:pPr algn="just"/>
+            <a:endParaRPr lang="en-US" sz="1400" b="1" dirty="0"/>
+          </a:p>
+          <a:p>
+            <a:pPr algn="just"/>
+            <a:r>
+              <a:rPr lang="en-US" sz="1400" b="1" dirty="0" smtClean="0"/>
+              <a:t>Whilst this tutorial is still sufficiently useful that it continues to warrant inclusion in current releases of </a:t>
             </a:r>
             <a:r>
               <a:rPr lang="en-US" sz="1400" b="1" dirty="0" err="1" smtClean="0"/>
@@ -3666,7 +3755,23 @@
             </a:r>
             <a:r>
               <a:rPr lang="en-US" sz="1400" b="1" dirty="0" smtClean="0"/>
-              <a:t> 2.1.x, and you are now using </a:t>
+              <a:t>, be aware that some functionality may have been added, changed, or even removed. So use this tutorial in concert with the </a:t>
+            </a:r>
+            <a:r>
+              <a:rPr lang="en-US" sz="1400" b="1" dirty="0" smtClean="0"/>
+              <a:t>documentation.</a:t>
+            </a:r>
+            <a:endParaRPr lang="en-US" sz="1400" b="1" dirty="0" smtClean="0"/>
+          </a:p>
+          <a:p>
+            <a:pPr algn="just"/>
+            <a:endParaRPr lang="en-US" sz="1400" b="1" dirty="0"/>
+          </a:p>
+          <a:p>
+            <a:pPr algn="just"/>
+            <a:r>
+              <a:rPr lang="en-US" sz="1400" b="1" dirty="0" smtClean="0"/>
+              <a:t>Thank you for your patience, and we hope you enjoy using </a:t>
             </a:r>
             <a:r>
               <a:rPr lang="en-US" sz="1400" b="1" dirty="0" err="1" smtClean="0"/>
@@ -3674,77 +3779,8 @@
             </a:r>
             <a:r>
               <a:rPr lang="en-US" sz="1400" b="1" dirty="0" smtClean="0"/>
-              <a:t> </a:t>
-            </a:r>
-            <a:r>
-              <a:rPr lang="en-US" sz="1400" b="1" dirty="0" smtClean="0"/>
-              <a:t>4.n.x</a:t>
-            </a:r>
-            <a:r>
-              <a:rPr lang="en-US" sz="1400" b="1" dirty="0" smtClean="0"/>
-              <a:t>. </a:t>
-            </a:r>
-            <a:r>
-              <a:rPr lang="en-US" sz="1400" b="1" dirty="0" smtClean="0"/>
-              <a:t>Rathe</a:t>
-            </a:r>
-            <a:r>
-              <a:rPr lang="en-US" sz="1400" b="1" dirty="0" smtClean="0"/>
-              <a:t>r than spending time </a:t>
-            </a:r>
-            <a:r>
-              <a:rPr lang="en-US" sz="1400" b="1" dirty="0" smtClean="0"/>
-              <a:t>updating </a:t>
-            </a:r>
-            <a:r>
-              <a:rPr lang="en-US" sz="1400" b="1" dirty="0" smtClean="0"/>
-              <a:t>this </a:t>
-            </a:r>
-            <a:r>
-              <a:rPr lang="en-US" sz="1400" b="1" dirty="0" smtClean="0"/>
-              <a:t>tutorial, we have instead been overhauling </a:t>
-            </a:r>
-            <a:r>
-              <a:rPr lang="en-US" sz="1400" b="1" dirty="0" smtClean="0"/>
-              <a:t>the </a:t>
-            </a:r>
-            <a:r>
-              <a:rPr lang="en-US" sz="1400" b="1" dirty="0" err="1" smtClean="0"/>
-              <a:t>SasView</a:t>
-            </a:r>
-            <a:r>
-              <a:rPr lang="en-US" sz="1400" b="1" dirty="0" smtClean="0"/>
-              <a:t> help guide (select ‘Help’ in the program menu bar</a:t>
-            </a:r>
-            <a:r>
-              <a:rPr lang="en-US" sz="1400" b="1" dirty="0" smtClean="0"/>
-              <a:t>) and initiating a new suite of tutorials. </a:t>
-            </a:r>
-            <a:r>
-              <a:rPr lang="en-US" sz="1400" b="1" dirty="0" smtClean="0"/>
-              <a:t>Indeed, we hope that members of the SAS Community, like yourself, will contribute some of these tutorials! If you want to know more, then please </a:t>
-            </a:r>
-            <a:r>
-              <a:rPr lang="en-US" sz="1400" b="1" dirty="0"/>
-              <a:t>visit: </a:t>
-            </a:r>
-            <a:r>
-              <a:rPr lang="en-US" sz="1400" b="1" dirty="0">
-                <a:hlinkClick r:id="rId2"/>
-              </a:rPr>
-              <a:t>http://</a:t>
-            </a:r>
-            <a:r>
-              <a:rPr lang="en-US" sz="1400" b="1" dirty="0" smtClean="0">
-                <a:hlinkClick r:id="rId2"/>
-              </a:rPr>
-              <a:t>trac.sasview.org/wiki/TutorialsTNGForAuthors</a:t>
-            </a:r>
-            <a:r>
-              <a:rPr lang="en-US" sz="1400" b="1" dirty="0" smtClean="0"/>
-              <a:t> .</a:t>
-            </a:r>
-            <a:endParaRPr lang="en-US" sz="1400" b="1" dirty="0" smtClean="0"/>
+              <a:t>!</a:t>
+            </a:r>
           </a:p>
           <a:p>
             <a:pPr algn="just"/>
@@ -3752,64 +3788,32 @@
           </a:p>
           <a:p>
             <a:pPr algn="just"/>
-            <a:r>
-              <a:rPr lang="en-US" sz="1400" b="1" dirty="0" smtClean="0"/>
-              <a:t>Whilst this tutorial is still sufficiently useful that it continues to warrant inclusion in current releases of </a:t>
-            </a:r>
-            <a:r>
-              <a:rPr lang="en-US" sz="1400" b="1" dirty="0" err="1" smtClean="0"/>
-              <a:t>SasView</a:t>
-            </a:r>
-            <a:r>
-              <a:rPr lang="en-US" sz="1400" b="1" dirty="0" smtClean="0"/>
-              <a:t>, be aware that some functionality may have been added, changed, or even removed. So use this tutorial in concert with the help guide.</a:t>
-            </a:r>
-          </a:p>
-          <a:p>
-            <a:pPr algn="just"/>
-            <a:endParaRPr lang="en-US" sz="1400" b="1" dirty="0"/>
-          </a:p>
-          <a:p>
-            <a:pPr algn="just"/>
-            <a:r>
-              <a:rPr lang="en-US" sz="1400" b="1" dirty="0" smtClean="0"/>
-              <a:t>Thank you for your patience, and we hope you enjoy using </a:t>
-            </a:r>
-            <a:r>
-              <a:rPr lang="en-US" sz="1400" b="1" dirty="0" err="1" smtClean="0"/>
-              <a:t>SasView</a:t>
-            </a:r>
-            <a:r>
-              <a:rPr lang="en-US" sz="1400" b="1" dirty="0" smtClean="0"/>
-              <a:t>!</a:t>
-            </a:r>
-          </a:p>
-          <a:p>
-            <a:pPr algn="just"/>
-            <a:endParaRPr lang="en-US" sz="1400" b="1" dirty="0"/>
+            <a:endParaRPr lang="en-US" sz="1400" b="1" dirty="0" smtClean="0"/>
           </a:p>
           <a:p>
             <a:pPr algn="just"/>
             <a:endParaRPr lang="en-US" sz="1400" b="1" dirty="0" smtClean="0"/>
           </a:p>
           <a:p>
-            <a:pPr algn="just"/>
+            <a:pPr algn="r"/>
+            <a:r>
+              <a:rPr lang="en-US" sz="1400" b="1" dirty="0" smtClean="0"/>
+              <a:t>The SasView </a:t>
+            </a:r>
+            <a:r>
+              <a:rPr lang="en-US" sz="1400" b="1" dirty="0" smtClean="0"/>
+              <a:t>Developers</a:t>
+            </a:r>
+          </a:p>
+          <a:p>
+            <a:pPr algn="r"/>
+            <a:r>
+              <a:rPr lang="en-US" sz="1400" b="1" dirty="0" smtClean="0">
+                <a:hlinkClick r:id="rId4"/>
+              </a:rPr>
+              <a:t>help@sasview.org</a:t>
+            </a:r>
             <a:endParaRPr lang="en-US" sz="1400" b="1" dirty="0" smtClean="0"/>
-          </a:p>
-          <a:p>
-            <a:pPr algn="r"/>
-            <a:r>
-              <a:rPr lang="en-US" sz="1400" b="1" dirty="0" smtClean="0"/>
-              <a:t>The </a:t>
-            </a:r>
-            <a:r>
-              <a:rPr lang="en-US" sz="1400" b="1" dirty="0" err="1" smtClean="0"/>
-              <a:t>SasView</a:t>
-            </a:r>
-            <a:r>
-              <a:rPr lang="en-US" sz="1400" b="1" dirty="0" smtClean="0"/>
-              <a:t> Developers</a:t>
-            </a:r>
           </a:p>
         </p:txBody>
       </p:sp>
@@ -10248,17 +10252,15 @@
           </p:cNvPicPr>
           <p:nvPr/>
         </p:nvPicPr>
-        <p:blipFill>
+        <p:blipFill rotWithShape="1">
           <a:blip r:embed="rId2" cstate="print"/>
-          <a:srcRect/>
-          <a:stretch>
-            <a:fillRect/>
-          </a:stretch>
+          <a:srcRect t="8197"/>
+          <a:stretch/>
         </p:blipFill>
         <p:spPr bwMode="auto">
           <a:xfrm>
             <a:off x="457200" y="838200"/>
-            <a:ext cx="5943600" cy="4648200"/>
+            <a:ext cx="5943600" cy="4191000"/>
           </a:xfrm>
           <a:prstGeom prst="rect">
             <a:avLst/>
@@ -10304,8 +10306,8 @@
         </p:nvSpPr>
         <p:spPr>
           <a:xfrm>
-            <a:off x="381000" y="5486400"/>
-            <a:ext cx="6096000" cy="3385542"/>
+            <a:off x="381000" y="5181600"/>
+            <a:ext cx="6096000" cy="3939540"/>
           </a:xfrm>
           <a:prstGeom prst="rect">
             <a:avLst/>
@@ -10318,164 +10320,154 @@
           </a:bodyPr>
           <a:lstStyle/>
           <a:p>
-            <a:r>
-              <a:rPr lang="en-US" sz="1400" dirty="0" smtClean="0"/>
-              <a:t>This software was originally developed by the University of Tennessee  as part of the Distributed Data Analysis of Neutron Scattering Experiments (DANSE) project funded by the US National Science Foundation and is currently being developed as an open source project hosted at </a:t>
-            </a:r>
-            <a:r>
-              <a:rPr lang="en-US" sz="1400" dirty="0" err="1" smtClean="0"/>
-              <a:t>SourceForge</a:t>
-            </a:r>
-            <a:r>
-              <a:rPr lang="en-US" sz="1400" dirty="0" smtClean="0"/>
-              <a:t> and managed by a consortium of scattering facilities.  Participating facilities include: The European </a:t>
-            </a:r>
-            <a:r>
-              <a:rPr lang="en-US" sz="1400" dirty="0" err="1" smtClean="0"/>
-              <a:t>Spallation</a:t>
-            </a:r>
-            <a:r>
-              <a:rPr lang="en-US" sz="1400" dirty="0" smtClean="0"/>
-              <a:t> Source, ISIS, The </a:t>
-            </a:r>
-            <a:r>
-              <a:rPr lang="en-US" sz="1400" dirty="0" err="1" smtClean="0"/>
+            <a:pPr algn="just"/>
+            <a:r>
+              <a:rPr lang="en-GB" sz="1200" dirty="0"/>
+              <a:t>SasView was originally developed by the University of Tennessee as part of the Distributed Data Analysis of Neutron Scattering Experiments (DANSE) project funded by the US National Science Foundation (NSF), but is currently being developed as an Open Source project hosted on GitHub and managed by a consortium of scattering facilities. Participating facilities include (in alphabetical order): the Australian National Science &amp; Technology Centre for Neutron Scattering, the Diamond Light Source, the European Spallation Source, the </a:t>
+            </a:r>
+            <a:r>
+              <a:rPr lang="en-GB" sz="1200" dirty="0" err="1"/>
               <a:t>Institut</a:t>
             </a:r>
             <a:r>
-              <a:rPr lang="en-US" sz="1400" dirty="0" smtClean="0"/>
+              <a:rPr lang="en-GB" sz="1200" dirty="0"/>
               <a:t> Laue </a:t>
             </a:r>
             <a:r>
-              <a:rPr lang="en-US" sz="1400" dirty="0" err="1" smtClean="0"/>
+              <a:rPr lang="en-GB" sz="1200" dirty="0" err="1"/>
               <a:t>Langevin</a:t>
             </a:r>
             <a:r>
-              <a:rPr lang="en-US" sz="1400" dirty="0" smtClean="0"/>
-              <a:t>, The National Institute of Standards and Technology Center for Neutron Research and the Oak Ridge National Laboratory Neutron Sciences Directorate.</a:t>
-            </a:r>
-          </a:p>
-          <a:p>
-            <a:endParaRPr lang="en-US" sz="1400" dirty="0" smtClean="0"/>
-          </a:p>
-          <a:p>
-            <a:r>
-              <a:rPr lang="en-US" sz="1200" dirty="0" smtClean="0"/>
-              <a:t>(c) 2009-2013 </a:t>
-            </a:r>
-            <a:r>
-              <a:rPr lang="en-US" sz="1200" i="1" dirty="0" smtClean="0"/>
-              <a:t>UMD, UTK, NIST, ORNL, ISIS, ESS  and ILL</a:t>
-            </a:r>
-            <a:endParaRPr lang="en-US" sz="1200" dirty="0" smtClean="0"/>
-          </a:p>
-          <a:p>
-            <a:pPr algn="r"/>
-            <a:endParaRPr lang="en-US" sz="1000" dirty="0" smtClean="0"/>
-          </a:p>
-          <a:p>
-            <a:r>
-              <a:rPr lang="en-US" sz="1100" dirty="0" smtClean="0"/>
-              <a:t>*If </a:t>
-            </a:r>
-            <a:r>
-              <a:rPr lang="en-US" sz="1100" dirty="0"/>
-              <a:t>you use this program to do productive scientific research that </a:t>
-            </a:r>
-            <a:r>
-              <a:rPr lang="en-US" sz="1100" dirty="0" smtClean="0"/>
+              <a:rPr lang="en-GB" sz="1200" dirty="0"/>
+              <a:t>, the ISIS Pulsed Neutron &amp; Muon Source, the National Institute of Standards &amp; Technology </a:t>
+            </a:r>
+            <a:r>
+              <a:rPr lang="en-GB" sz="1200" dirty="0" err="1"/>
+              <a:t>Center</a:t>
+            </a:r>
+            <a:r>
+              <a:rPr lang="en-GB" sz="1200" dirty="0"/>
+              <a:t> for Neutron Research, the Oak Ridge National Laboratory Neutron Sciences Directorate, and the Technical University Delft Reactor Institute.</a:t>
+            </a:r>
+          </a:p>
+          <a:p>
+            <a:pPr algn="just"/>
+            <a:endParaRPr lang="en-GB" sz="800" dirty="0"/>
+          </a:p>
+          <a:p>
+            <a:pPr algn="just"/>
+            <a:r>
+              <a:rPr lang="en-GB" sz="1200" dirty="0"/>
+              <a:t>SasView is distributed under a 'Three-clause' BSD licence which you may read here</a:t>
+            </a:r>
+            <a:r>
+              <a:rPr lang="en-GB" sz="1200" dirty="0" smtClean="0"/>
+              <a:t>: </a:t>
+            </a:r>
+            <a:r>
+              <a:rPr lang="en-GB" sz="1200" dirty="0" smtClean="0">
+                <a:hlinkClick r:id="rId3"/>
+              </a:rPr>
+              <a:t>https</a:t>
+            </a:r>
+            <a:r>
+              <a:rPr lang="en-GB" sz="1200" dirty="0">
+                <a:hlinkClick r:id="rId3"/>
+              </a:rPr>
+              <a:t>://</a:t>
+            </a:r>
+            <a:r>
+              <a:rPr lang="en-GB" sz="1200" dirty="0" smtClean="0">
+                <a:hlinkClick r:id="rId3"/>
+              </a:rPr>
+              <a:t>github.com/SasView/sasview/blob/master/LICENSE.TXT</a:t>
+            </a:r>
+            <a:r>
+              <a:rPr lang="en-GB" sz="1200" dirty="0" smtClean="0"/>
+              <a:t>  </a:t>
+            </a:r>
+            <a:endParaRPr lang="en-GB" sz="1200" dirty="0"/>
+          </a:p>
+          <a:p>
+            <a:endParaRPr lang="en-GB" sz="800" dirty="0"/>
+          </a:p>
+          <a:p>
+            <a:r>
+              <a:rPr lang="en-GB" sz="1200" i="1" dirty="0"/>
+              <a:t>SasView is free to download and use, including for commercial purposes.</a:t>
+            </a:r>
+          </a:p>
+          <a:p>
+            <a:endParaRPr lang="en-GB" sz="800" dirty="0"/>
+          </a:p>
+          <a:p>
+            <a:r>
+              <a:rPr lang="en-GB" sz="1200" dirty="0"/>
+              <a:t>© </a:t>
+            </a:r>
+            <a:r>
+              <a:rPr lang="en-GB" sz="1200" dirty="0" smtClean="0"/>
+              <a:t>2009-2018 </a:t>
+            </a:r>
+            <a:r>
+              <a:rPr lang="en-GB" sz="1200" dirty="0"/>
+              <a:t>UMD, UTK, NIST, ORNL, ISIS, ESS, </a:t>
+            </a:r>
+            <a:r>
+              <a:rPr lang="en-GB" sz="1200" dirty="0" smtClean="0"/>
+              <a:t>ANSTO, ILL, TUD, DLS</a:t>
+            </a:r>
+          </a:p>
+          <a:p>
+            <a:endParaRPr lang="en-US" sz="800" dirty="0" smtClean="0"/>
+          </a:p>
+          <a:p>
+            <a:r>
+              <a:rPr lang="en-US" sz="1000" b="1" dirty="0" smtClean="0"/>
+              <a:t>If </a:t>
+            </a:r>
+            <a:r>
+              <a:rPr lang="en-US" sz="1000" b="1" dirty="0"/>
+              <a:t>you use </a:t>
+            </a:r>
+            <a:r>
+              <a:rPr lang="en-US" sz="1000" b="1" dirty="0" smtClean="0"/>
+              <a:t>SasView to </a:t>
+            </a:r>
+            <a:r>
+              <a:rPr lang="en-US" sz="1000" b="1" dirty="0"/>
+              <a:t>do productive scientific research that </a:t>
+            </a:r>
+            <a:r>
+              <a:rPr lang="en-US" sz="1000" b="1" dirty="0" smtClean="0"/>
               <a:t>leads to </a:t>
             </a:r>
             <a:r>
-              <a:rPr lang="en-US" sz="1100" dirty="0"/>
-              <a:t>publication, we ask that you acknowledge use of the program by </a:t>
-            </a:r>
-            <a:r>
-              <a:rPr lang="en-US" sz="1100" dirty="0" smtClean="0"/>
-              <a:t>citing the </a:t>
-            </a:r>
-            <a:r>
-              <a:rPr lang="en-US" sz="1100" dirty="0"/>
-              <a:t>following paper in your publication</a:t>
-            </a:r>
-            <a:r>
-              <a:rPr lang="en-US" sz="1100" dirty="0" smtClean="0"/>
-              <a:t>:</a:t>
-            </a:r>
-          </a:p>
-          <a:p>
-            <a:r>
-              <a:rPr lang="en-US" sz="1100" dirty="0"/>
-              <a:t>"</a:t>
-            </a:r>
-            <a:r>
-              <a:rPr lang="en-US" sz="1100" dirty="0">
-                <a:solidFill>
-                  <a:srgbClr val="FF0000"/>
-                </a:solidFill>
-              </a:rPr>
-              <a:t>This work benefited from DANSE software developed under NSF award DMR-0520547</a:t>
-            </a:r>
-            <a:r>
-              <a:rPr lang="en-US" sz="1100" dirty="0" smtClean="0">
-                <a:solidFill>
-                  <a:srgbClr val="FF0000"/>
-                </a:solidFill>
-              </a:rPr>
-              <a:t>.</a:t>
-            </a:r>
-            <a:r>
-              <a:rPr lang="en-US" sz="1100" dirty="0" smtClean="0"/>
-              <a:t>“</a:t>
-            </a:r>
-          </a:p>
-          <a:p>
-            <a:endParaRPr lang="en-US" sz="1100" dirty="0"/>
-          </a:p>
-          <a:p>
-            <a:r>
-              <a:rPr lang="en-US" sz="1100" i="1" dirty="0" smtClean="0"/>
-              <a:t>G. </a:t>
-            </a:r>
-            <a:r>
-              <a:rPr lang="en-US" sz="1100" i="1" dirty="0" err="1" smtClean="0"/>
-              <a:t>Alina</a:t>
-            </a:r>
-            <a:r>
-              <a:rPr lang="en-US" sz="1100" i="1" dirty="0" smtClean="0"/>
-              <a:t>, P. </a:t>
-            </a:r>
-            <a:r>
-              <a:rPr lang="en-US" sz="1100" i="1" dirty="0"/>
-              <a:t>Butler, </a:t>
-            </a:r>
-            <a:r>
-              <a:rPr lang="en-US" sz="1100" i="1" dirty="0" smtClean="0"/>
-              <a:t>J. Cho,  M. </a:t>
-            </a:r>
-            <a:r>
-              <a:rPr lang="en-US" sz="1100" i="1" dirty="0" err="1" smtClean="0"/>
-              <a:t>Doucet</a:t>
-            </a:r>
-            <a:r>
-              <a:rPr lang="en-US" sz="1100" i="1" dirty="0" smtClean="0"/>
-              <a:t>, and   P. </a:t>
-            </a:r>
-            <a:r>
-              <a:rPr lang="en-US" sz="1100" i="1" dirty="0" err="1" smtClean="0"/>
-              <a:t>Kienzle</a:t>
-            </a:r>
-            <a:r>
-              <a:rPr lang="en-US" sz="1100" i="1" dirty="0" smtClean="0"/>
-              <a:t>,</a:t>
-            </a:r>
-          </a:p>
-          <a:p>
-            <a:r>
-              <a:rPr lang="en-US" sz="1100" i="1" dirty="0" smtClean="0"/>
-              <a:t>"SANS analysis software", to be published.</a:t>
-            </a:r>
-            <a:endParaRPr lang="en-US" sz="1100" i="1" dirty="0"/>
+              <a:rPr lang="en-US" sz="1000" b="1" dirty="0"/>
+              <a:t>publication, we ask that you acknowledge </a:t>
+            </a:r>
+            <a:r>
+              <a:rPr lang="en-GB" sz="1000" b="1" dirty="0"/>
+              <a:t>use of the program with the following text:</a:t>
+            </a:r>
+          </a:p>
+          <a:p>
+            <a:endParaRPr lang="en-GB" sz="800" dirty="0"/>
+          </a:p>
+          <a:p>
+            <a:r>
+              <a:rPr lang="en-GB" sz="1000" b="1" dirty="0" smtClean="0"/>
+              <a:t>“This </a:t>
+            </a:r>
+            <a:r>
+              <a:rPr lang="en-GB" sz="1000" b="1" dirty="0"/>
+              <a:t>work benefited from the use of the SasView application, originally developed under NSF Award DMR-0520547. SasView also contains code developed with funding from the EU Horizon 2020 programme under the SINE2020 project Grant No 654000</a:t>
+            </a:r>
+            <a:r>
+              <a:rPr lang="en-GB" sz="1000" b="1" dirty="0" smtClean="0"/>
+              <a:t>.”</a:t>
+            </a:r>
+            <a:endParaRPr lang="en-US" sz="1000" b="1" dirty="0" smtClean="0"/>
           </a:p>
         </p:txBody>
       </p:sp>
@@ -10487,8 +10479,8 @@
         </p:nvSpPr>
         <p:spPr>
           <a:xfrm>
-            <a:off x="2526097" y="304800"/>
-            <a:ext cx="1741103" cy="523220"/>
+            <a:off x="2710849" y="304800"/>
+            <a:ext cx="1436303" cy="523220"/>
           </a:xfrm>
           <a:prstGeom prst="rect">
             <a:avLst/>
@@ -17646,7 +17638,7 @@
           <a:graphicData uri="http://schemas.openxmlformats.org/presentationml/2006/ole">
             <mc:AlternateContent xmlns:mc="http://schemas.openxmlformats.org/markup-compatibility/2006">
               <mc:Choice xmlns:v="urn:schemas-microsoft-com:vml" Requires="v">
-                <p:oleObj spid="_x0000_s4141" name="Equation" r:id="rId3" imgW="1206360" imgH="330120" progId="Equation.3">
+                <p:oleObj spid="_x0000_s4145" name="Equation" r:id="rId3" imgW="1206360" imgH="330120" progId="Equation.3">
                   <p:embed/>
                 </p:oleObj>
               </mc:Choice>
@@ -17716,7 +17708,7 @@
           <a:graphicData uri="http://schemas.openxmlformats.org/presentationml/2006/ole">
             <mc:AlternateContent xmlns:mc="http://schemas.openxmlformats.org/markup-compatibility/2006">
               <mc:Choice xmlns:v="urn:schemas-microsoft-com:vml" Requires="v">
-                <p:oleObj spid="_x0000_s4142" name="Equation" r:id="rId5" imgW="1206360" imgH="330120" progId="Equation.3">
+                <p:oleObj spid="_x0000_s4146" name="Equation" r:id="rId5" imgW="1206360" imgH="330120" progId="Equation.3">
                   <p:embed/>
                 </p:oleObj>
               </mc:Choice>
@@ -18131,7 +18123,7 @@
           <a:graphicData uri="http://schemas.openxmlformats.org/presentationml/2006/ole">
             <mc:AlternateContent xmlns:mc="http://schemas.openxmlformats.org/markup-compatibility/2006">
               <mc:Choice xmlns:v="urn:schemas-microsoft-com:vml" Requires="v">
-                <p:oleObj spid="_x0000_s51216" name="Equation" r:id="rId4" imgW="1536480" imgH="444240" progId="Equation.3">
+                <p:oleObj spid="_x0000_s51222" name="Equation" r:id="rId4" imgW="1536480" imgH="444240" progId="Equation.3">
                   <p:embed/>
                 </p:oleObj>
               </mc:Choice>
@@ -18201,7 +18193,7 @@
           <a:graphicData uri="http://schemas.openxmlformats.org/presentationml/2006/ole">
             <mc:AlternateContent xmlns:mc="http://schemas.openxmlformats.org/markup-compatibility/2006">
               <mc:Choice xmlns:v="urn:schemas-microsoft-com:vml" Requires="v">
-                <p:oleObj spid="_x0000_s51217" name="Equation" r:id="rId6" imgW="965160" imgH="431640" progId="Equation.3">
+                <p:oleObj spid="_x0000_s51223" name="Equation" r:id="rId6" imgW="965160" imgH="431640" progId="Equation.3">
                   <p:embed/>
                 </p:oleObj>
               </mc:Choice>
@@ -18271,7 +18263,7 @@
           <a:graphicData uri="http://schemas.openxmlformats.org/presentationml/2006/ole">
             <mc:AlternateContent xmlns:mc="http://schemas.openxmlformats.org/markup-compatibility/2006">
               <mc:Choice xmlns:v="urn:schemas-microsoft-com:vml" Requires="v">
-                <p:oleObj spid="_x0000_s51218" name="Equation" r:id="rId8" imgW="1752480" imgH="444240" progId="Equation.3">
+                <p:oleObj spid="_x0000_s51224" name="Equation" r:id="rId8" imgW="1752480" imgH="444240" progId="Equation.3">
                   <p:embed/>
                 </p:oleObj>
               </mc:Choice>

</xml_diff>

<commit_message>
Updated link to new tutorials in old tutorials
</commit_message>
<xml_diff>
--- a/docs/sasview/Tutorial.pptx
+++ b/docs/sasview/Tutorial.pptx
@@ -248,7 +248,7 @@
             <a:fld id="{ADF864E8-D8BA-455C-BC0C-1F3741EC3C1C}" type="datetimeFigureOut">
               <a:rPr lang="en-US" smtClean="0"/>
               <a:pPr/>
-              <a:t>9/11/2018</a:t>
+              <a:t>2/18/2019</a:t>
             </a:fld>
             <a:endParaRPr lang="en-US"/>
           </a:p>
@@ -783,7 +783,7 @@
             <a:fld id="{0C0FAC7B-070D-4BC5-975E-2226A222BC04}" type="datetimeFigureOut">
               <a:rPr lang="en-US" smtClean="0"/>
               <a:pPr/>
-              <a:t>9/11/2018</a:t>
+              <a:t>2/18/2019</a:t>
             </a:fld>
             <a:endParaRPr lang="en-US"/>
           </a:p>
@@ -950,7 +950,7 @@
             <a:fld id="{0C0FAC7B-070D-4BC5-975E-2226A222BC04}" type="datetimeFigureOut">
               <a:rPr lang="en-US" smtClean="0"/>
               <a:pPr/>
-              <a:t>9/11/2018</a:t>
+              <a:t>2/18/2019</a:t>
             </a:fld>
             <a:endParaRPr lang="en-US"/>
           </a:p>
@@ -1127,7 +1127,7 @@
             <a:fld id="{0C0FAC7B-070D-4BC5-975E-2226A222BC04}" type="datetimeFigureOut">
               <a:rPr lang="en-US" smtClean="0"/>
               <a:pPr/>
-              <a:t>9/11/2018</a:t>
+              <a:t>2/18/2019</a:t>
             </a:fld>
             <a:endParaRPr lang="en-US"/>
           </a:p>
@@ -1294,7 +1294,7 @@
             <a:fld id="{0C0FAC7B-070D-4BC5-975E-2226A222BC04}" type="datetimeFigureOut">
               <a:rPr lang="en-US" smtClean="0"/>
               <a:pPr/>
-              <a:t>9/11/2018</a:t>
+              <a:t>2/18/2019</a:t>
             </a:fld>
             <a:endParaRPr lang="en-US"/>
           </a:p>
@@ -1537,7 +1537,7 @@
             <a:fld id="{0C0FAC7B-070D-4BC5-975E-2226A222BC04}" type="datetimeFigureOut">
               <a:rPr lang="en-US" smtClean="0"/>
               <a:pPr/>
-              <a:t>9/11/2018</a:t>
+              <a:t>2/18/2019</a:t>
             </a:fld>
             <a:endParaRPr lang="en-US"/>
           </a:p>
@@ -1822,7 +1822,7 @@
             <a:fld id="{0C0FAC7B-070D-4BC5-975E-2226A222BC04}" type="datetimeFigureOut">
               <a:rPr lang="en-US" smtClean="0"/>
               <a:pPr/>
-              <a:t>9/11/2018</a:t>
+              <a:t>2/18/2019</a:t>
             </a:fld>
             <a:endParaRPr lang="en-US"/>
           </a:p>
@@ -2241,7 +2241,7 @@
             <a:fld id="{0C0FAC7B-070D-4BC5-975E-2226A222BC04}" type="datetimeFigureOut">
               <a:rPr lang="en-US" smtClean="0"/>
               <a:pPr/>
-              <a:t>9/11/2018</a:t>
+              <a:t>2/18/2019</a:t>
             </a:fld>
             <a:endParaRPr lang="en-US"/>
           </a:p>
@@ -2356,7 +2356,7 @@
             <a:fld id="{0C0FAC7B-070D-4BC5-975E-2226A222BC04}" type="datetimeFigureOut">
               <a:rPr lang="en-US" smtClean="0"/>
               <a:pPr/>
-              <a:t>9/11/2018</a:t>
+              <a:t>2/18/2019</a:t>
             </a:fld>
             <a:endParaRPr lang="en-US"/>
           </a:p>
@@ -2448,7 +2448,7 @@
             <a:fld id="{0C0FAC7B-070D-4BC5-975E-2226A222BC04}" type="datetimeFigureOut">
               <a:rPr lang="en-US" smtClean="0"/>
               <a:pPr/>
-              <a:t>9/11/2018</a:t>
+              <a:t>2/18/2019</a:t>
             </a:fld>
             <a:endParaRPr lang="en-US"/>
           </a:p>
@@ -2722,7 +2722,7 @@
             <a:fld id="{0C0FAC7B-070D-4BC5-975E-2226A222BC04}" type="datetimeFigureOut">
               <a:rPr lang="en-US" smtClean="0"/>
               <a:pPr/>
-              <a:t>9/11/2018</a:t>
+              <a:t>2/18/2019</a:t>
             </a:fld>
             <a:endParaRPr lang="en-US"/>
           </a:p>
@@ -2972,7 +2972,7 @@
             <a:fld id="{0C0FAC7B-070D-4BC5-975E-2226A222BC04}" type="datetimeFigureOut">
               <a:rPr lang="en-US" smtClean="0"/>
               <a:pPr/>
-              <a:t>9/11/2018</a:t>
+              <a:t>2/18/2019</a:t>
             </a:fld>
             <a:endParaRPr lang="en-US"/>
           </a:p>
@@ -3182,7 +3182,7 @@
             <a:fld id="{0C0FAC7B-070D-4BC5-975E-2226A222BC04}" type="datetimeFigureOut">
               <a:rPr lang="en-US" smtClean="0"/>
               <a:pPr/>
-              <a:t>9/11/2018</a:t>
+              <a:t>2/18/2019</a:t>
             </a:fld>
             <a:endParaRPr lang="en-US"/>
           </a:p>
@@ -3606,11 +3606,7 @@
           <a:p>
             <a:r>
               <a:rPr lang="en-US" b="1" dirty="0" smtClean="0"/>
-              <a:t>Preface for Users of SasView </a:t>
-            </a:r>
-            <a:r>
-              <a:rPr lang="en-US" b="1" dirty="0" smtClean="0"/>
-              <a:t>3.n.x/4.n.x</a:t>
+              <a:t>Preface for Users of SasView 3.n.x/4.n.x</a:t>
             </a:r>
             <a:endParaRPr lang="en-US" dirty="0" smtClean="0"/>
           </a:p>
@@ -3666,57 +3662,41 @@
             <a:pPr algn="just"/>
             <a:r>
               <a:rPr lang="en-US" sz="1400" b="1" dirty="0" smtClean="0"/>
-              <a:t>This tutorial was written for SasView 2.1.x, and you are now using </a:t>
+              <a:t>This tutorial was written for SasView 2.1.x, and you are now using SasView 3.n.x/4.n.x. Rather than spending time updating this tutorial, we have instead been overhauling the SasView documentation (select ‘Help’ then ‘Documentation’ in the program menu bar) and initiating a new suite of </a:t>
+            </a:r>
+            <a:r>
+              <a:rPr lang="en-US" sz="1400" b="1" dirty="0"/>
+              <a:t>tutorials (</a:t>
+            </a:r>
+            <a:r>
+              <a:rPr lang="en-US" sz="1400" b="1"/>
+              <a:t>see </a:t>
+            </a:r>
+            <a:r>
+              <a:rPr lang="en-US" sz="1400" b="1">
+                <a:hlinkClick r:id="rId2"/>
+              </a:rPr>
+              <a:t>http://</a:t>
+            </a:r>
+            <a:r>
+              <a:rPr lang="en-US" sz="1400" b="1">
+                <a:hlinkClick r:id="rId2"/>
+              </a:rPr>
+              <a:t>www.sasview.org/download</a:t>
+            </a:r>
+            <a:r>
+              <a:rPr lang="en-US" sz="1400" b="1" smtClean="0">
+                <a:hlinkClick r:id="rId2"/>
+              </a:rPr>
+              <a:t>/</a:t>
+            </a:r>
+            <a:r>
+              <a:rPr lang="en-US" sz="1400" b="1" smtClean="0"/>
+              <a:t>). </a:t>
             </a:r>
             <a:r>
               <a:rPr lang="en-US" sz="1400" b="1" dirty="0" smtClean="0"/>
-              <a:t>SasView 3.n.x/4.n.x</a:t>
-            </a:r>
-            <a:r>
-              <a:rPr lang="en-US" sz="1400" b="1" dirty="0" smtClean="0"/>
-              <a:t>. Rather than spending time updating this tutorial, we have instead been overhauling the SasView </a:t>
-            </a:r>
-            <a:r>
-              <a:rPr lang="en-US" sz="1400" b="1" dirty="0" smtClean="0"/>
-              <a:t>documentation</a:t>
-            </a:r>
-            <a:r>
-              <a:rPr lang="en-US" sz="1400" b="1" dirty="0" smtClean="0"/>
-              <a:t> </a:t>
-            </a:r>
-            <a:r>
-              <a:rPr lang="en-US" sz="1400" b="1" dirty="0" smtClean="0"/>
-              <a:t>(select ‘Help</a:t>
-            </a:r>
-            <a:r>
-              <a:rPr lang="en-US" sz="1400" b="1" dirty="0" smtClean="0"/>
-              <a:t>’ then ‘Documentation’ </a:t>
-            </a:r>
-            <a:r>
-              <a:rPr lang="en-US" sz="1400" b="1" dirty="0" smtClean="0"/>
-              <a:t>in the program menu bar) and initiating a new suite of </a:t>
-            </a:r>
-            <a:r>
-              <a:rPr lang="en-US" sz="1400" b="1" dirty="0"/>
-              <a:t>tutorials (see </a:t>
-            </a:r>
-            <a:r>
-              <a:rPr lang="en-US" sz="1400" b="1" dirty="0">
-                <a:hlinkClick r:id="rId2"/>
-              </a:rPr>
-              <a:t>http://www.sasview.org/links.html</a:t>
-            </a:r>
-            <a:r>
-              <a:rPr lang="en-US" sz="1400" b="1" dirty="0" smtClean="0"/>
-              <a:t>). </a:t>
-            </a:r>
-            <a:r>
-              <a:rPr lang="en-US" sz="1400" b="1" dirty="0" smtClean="0"/>
-              <a:t>Indeed</a:t>
-            </a:r>
-            <a:r>
-              <a:rPr lang="en-US" sz="1400" b="1" dirty="0" smtClean="0"/>
-              <a:t>, we hope that members of the SAS Community, like yourself, will contribute some of these tutorials! If you want to know more, then please </a:t>
+              <a:t>Indeed, we hope that members of the SAS Community, like yourself, will contribute some of these tutorials! If you want to know more, then please </a:t>
             </a:r>
             <a:r>
               <a:rPr lang="en-US" sz="1400" b="1" dirty="0"/>
@@ -3755,13 +3735,8 @@
             </a:r>
             <a:r>
               <a:rPr lang="en-US" sz="1400" b="1" dirty="0" smtClean="0"/>
-              <a:t>, be aware that some functionality may have been added, changed, or even removed. So use this tutorial in concert with the </a:t>
-            </a:r>
-            <a:r>
-              <a:rPr lang="en-US" sz="1400" b="1" dirty="0" smtClean="0"/>
-              <a:t>documentation.</a:t>
-            </a:r>
-            <a:endParaRPr lang="en-US" sz="1400" b="1" dirty="0" smtClean="0"/>
+              <a:t>, be aware that some functionality may have been added, changed, or even removed. So use this tutorial in concert with the documentation.</a:t>
+            </a:r>
           </a:p>
           <a:p>
             <a:pPr algn="just"/>
@@ -3798,11 +3773,7 @@
             <a:pPr algn="r"/>
             <a:r>
               <a:rPr lang="en-US" sz="1400" b="1" dirty="0" smtClean="0"/>
-              <a:t>The SasView </a:t>
-            </a:r>
-            <a:r>
-              <a:rPr lang="en-US" sz="1400" b="1" dirty="0" smtClean="0"/>
-              <a:t>Developers</a:t>
+              <a:t>The SasView Developers</a:t>
             </a:r>
           </a:p>
           <a:p>
@@ -17638,7 +17609,7 @@
           <a:graphicData uri="http://schemas.openxmlformats.org/presentationml/2006/ole">
             <mc:AlternateContent xmlns:mc="http://schemas.openxmlformats.org/markup-compatibility/2006">
               <mc:Choice xmlns:v="urn:schemas-microsoft-com:vml" Requires="v">
-                <p:oleObj spid="_x0000_s4145" name="Equation" r:id="rId3" imgW="1206360" imgH="330120" progId="Equation.3">
+                <p:oleObj spid="_x0000_s4147" name="Equation" r:id="rId3" imgW="1206360" imgH="330120" progId="Equation.3">
                   <p:embed/>
                 </p:oleObj>
               </mc:Choice>
@@ -17708,7 +17679,7 @@
           <a:graphicData uri="http://schemas.openxmlformats.org/presentationml/2006/ole">
             <mc:AlternateContent xmlns:mc="http://schemas.openxmlformats.org/markup-compatibility/2006">
               <mc:Choice xmlns:v="urn:schemas-microsoft-com:vml" Requires="v">
-                <p:oleObj spid="_x0000_s4146" name="Equation" r:id="rId5" imgW="1206360" imgH="330120" progId="Equation.3">
+                <p:oleObj spid="_x0000_s4148" name="Equation" r:id="rId5" imgW="1206360" imgH="330120" progId="Equation.3">
                   <p:embed/>
                 </p:oleObj>
               </mc:Choice>
@@ -18123,7 +18094,7 @@
           <a:graphicData uri="http://schemas.openxmlformats.org/presentationml/2006/ole">
             <mc:AlternateContent xmlns:mc="http://schemas.openxmlformats.org/markup-compatibility/2006">
               <mc:Choice xmlns:v="urn:schemas-microsoft-com:vml" Requires="v">
-                <p:oleObj spid="_x0000_s51222" name="Equation" r:id="rId4" imgW="1536480" imgH="444240" progId="Equation.3">
+                <p:oleObj spid="_x0000_s51225" name="Equation" r:id="rId4" imgW="1536480" imgH="444240" progId="Equation.3">
                   <p:embed/>
                 </p:oleObj>
               </mc:Choice>
@@ -18193,7 +18164,7 @@
           <a:graphicData uri="http://schemas.openxmlformats.org/presentationml/2006/ole">
             <mc:AlternateContent xmlns:mc="http://schemas.openxmlformats.org/markup-compatibility/2006">
               <mc:Choice xmlns:v="urn:schemas-microsoft-com:vml" Requires="v">
-                <p:oleObj spid="_x0000_s51223" name="Equation" r:id="rId6" imgW="965160" imgH="431640" progId="Equation.3">
+                <p:oleObj spid="_x0000_s51226" name="Equation" r:id="rId6" imgW="965160" imgH="431640" progId="Equation.3">
                   <p:embed/>
                 </p:oleObj>
               </mc:Choice>
@@ -18263,7 +18234,7 @@
           <a:graphicData uri="http://schemas.openxmlformats.org/presentationml/2006/ole">
             <mc:AlternateContent xmlns:mc="http://schemas.openxmlformats.org/markup-compatibility/2006">
               <mc:Choice xmlns:v="urn:schemas-microsoft-com:vml" Requires="v">
-                <p:oleObj spid="_x0000_s51224" name="Equation" r:id="rId8" imgW="1752480" imgH="444240" progId="Equation.3">
+                <p:oleObj spid="_x0000_s51227" name="Equation" r:id="rId8" imgW="1752480" imgH="444240" progId="Equation.3">
                   <p:embed/>
                 </p:oleObj>
               </mc:Choice>

</xml_diff>